<commit_message>
Changed a diagram in the presentation
</commit_message>
<xml_diff>
--- a/Documentation/Presentation.pptx
+++ b/Documentation/Presentation.pptx
@@ -489,7 +489,7 @@
           <a:p>
             <a:fld id="{C8A432C8-69A7-458B-9684-2BFA64B31948}" type="datetime2">
               <a:rPr lang="en-US" smtClean="0"/>
-              <a:t>Monday, June 3, 13</a:t>
+              <a:t>Tuesday, June 11, 13</a:t>
             </a:fld>
             <a:endParaRPr lang="en-US"/>
           </a:p>
@@ -919,7 +919,7 @@
           <a:p>
             <a:fld id="{C3CD0DB5-738A-BD40-A1D6-248A99BCF0F5}" type="datetimeFigureOut">
               <a:rPr lang="en-US" smtClean="0"/>
-              <a:t>6/3/13</a:t>
+              <a:t>6/11/13</a:t>
             </a:fld>
             <a:endParaRPr lang="en-US"/>
           </a:p>
@@ -1124,7 +1124,7 @@
           <a:p>
             <a:fld id="{C3CD0DB5-738A-BD40-A1D6-248A99BCF0F5}" type="datetimeFigureOut">
               <a:rPr lang="en-US" smtClean="0"/>
-              <a:t>6/3/13</a:t>
+              <a:t>6/11/13</a:t>
             </a:fld>
             <a:endParaRPr lang="en-US"/>
           </a:p>
@@ -1395,7 +1395,7 @@
           <a:p>
             <a:fld id="{C3CD0DB5-738A-BD40-A1D6-248A99BCF0F5}" type="datetimeFigureOut">
               <a:rPr lang="en-US" smtClean="0"/>
-              <a:t>6/3/13</a:t>
+              <a:t>6/11/13</a:t>
             </a:fld>
             <a:endParaRPr lang="en-US"/>
           </a:p>
@@ -1676,7 +1676,7 @@
           <a:p>
             <a:fld id="{C3CD0DB5-738A-BD40-A1D6-248A99BCF0F5}" type="datetimeFigureOut">
               <a:rPr lang="en-US" smtClean="0"/>
-              <a:t>6/3/13</a:t>
+              <a:t>6/11/13</a:t>
             </a:fld>
             <a:endParaRPr lang="en-US"/>
           </a:p>
@@ -1911,7 +1911,7 @@
           <a:p>
             <a:fld id="{C3CD0DB5-738A-BD40-A1D6-248A99BCF0F5}" type="datetimeFigureOut">
               <a:rPr lang="en-US" smtClean="0"/>
-              <a:t>6/3/13</a:t>
+              <a:t>6/11/13</a:t>
             </a:fld>
             <a:endParaRPr lang="en-US"/>
           </a:p>
@@ -2192,7 +2192,7 @@
           <a:p>
             <a:fld id="{C3CD0DB5-738A-BD40-A1D6-248A99BCF0F5}" type="datetimeFigureOut">
               <a:rPr lang="en-US" smtClean="0"/>
-              <a:t>6/3/13</a:t>
+              <a:t>6/11/13</a:t>
             </a:fld>
             <a:endParaRPr lang="en-US"/>
           </a:p>
@@ -2619,7 +2619,7 @@
           <a:p>
             <a:fld id="{C3CD0DB5-738A-BD40-A1D6-248A99BCF0F5}" type="datetimeFigureOut">
               <a:rPr lang="en-US" smtClean="0"/>
-              <a:t>6/3/13</a:t>
+              <a:t>6/11/13</a:t>
             </a:fld>
             <a:endParaRPr lang="en-US"/>
           </a:p>
@@ -3143,7 +3143,7 @@
           <a:p>
             <a:fld id="{9933D019-A32C-4EAD-B8E6-DBDA699692FD}" type="datetime2">
               <a:rPr lang="en-US" smtClean="0"/>
-              <a:t>Monday, June 3, 13</a:t>
+              <a:t>Tuesday, June 11, 13</a:t>
             </a:fld>
             <a:endParaRPr lang="en-US"/>
           </a:p>
@@ -3505,7 +3505,7 @@
           <a:p>
             <a:fld id="{C3CD0DB5-738A-BD40-A1D6-248A99BCF0F5}" type="datetimeFigureOut">
               <a:rPr lang="en-US" smtClean="0"/>
-              <a:t>6/3/13</a:t>
+              <a:t>6/11/13</a:t>
             </a:fld>
             <a:endParaRPr lang="en-US"/>
           </a:p>
@@ -4061,7 +4061,7 @@
           <a:p>
             <a:fld id="{C3CD0DB5-738A-BD40-A1D6-248A99BCF0F5}" type="datetimeFigureOut">
               <a:rPr lang="en-US" smtClean="0"/>
-              <a:t>6/3/13</a:t>
+              <a:t>6/11/13</a:t>
             </a:fld>
             <a:endParaRPr lang="en-US"/>
           </a:p>
@@ -4286,7 +4286,7 @@
           <a:p>
             <a:fld id="{C3CD0DB5-738A-BD40-A1D6-248A99BCF0F5}" type="datetimeFigureOut">
               <a:rPr lang="en-US" smtClean="0"/>
-              <a:t>6/3/13</a:t>
+              <a:t>6/11/13</a:t>
             </a:fld>
             <a:endParaRPr lang="en-US"/>
           </a:p>
@@ -4432,7 +4432,7 @@
           <a:p>
             <a:fld id="{C3CD0DB5-738A-BD40-A1D6-248A99BCF0F5}" type="datetimeFigureOut">
               <a:rPr lang="en-US" smtClean="0"/>
-              <a:t>6/3/13</a:t>
+              <a:t>6/11/13</a:t>
             </a:fld>
             <a:endParaRPr lang="en-US"/>
           </a:p>
@@ -4897,7 +4897,7 @@
           <a:p>
             <a:fld id="{C3CD0DB5-738A-BD40-A1D6-248A99BCF0F5}" type="datetimeFigureOut">
               <a:rPr lang="en-US" smtClean="0"/>
-              <a:t>6/3/13</a:t>
+              <a:t>6/11/13</a:t>
             </a:fld>
             <a:endParaRPr lang="en-US"/>
           </a:p>
@@ -5120,7 +5120,7 @@
           <a:p>
             <a:fld id="{C3CD0DB5-738A-BD40-A1D6-248A99BCF0F5}" type="datetimeFigureOut">
               <a:rPr lang="en-US" smtClean="0"/>
-              <a:t>6/3/13</a:t>
+              <a:t>6/11/13</a:t>
             </a:fld>
             <a:endParaRPr lang="en-US"/>
           </a:p>
@@ -6310,7 +6310,7 @@
       </p:sp>
       <p:pic>
         <p:nvPicPr>
-          <p:cNvPr id="4" name="Content Placeholder 3" descr="FahrplanAbfragen.png"/>
+          <p:cNvPr id="4" name="Content Placeholder 3"/>
           <p:cNvPicPr>
             <a:picLocks noGrp="1" noChangeAspect="1"/>
           </p:cNvPicPr>
@@ -6326,12 +6326,16 @@
               </a:ext>
             </a:extLst>
           </a:blip>
-          <a:srcRect t="-11723" b="-11723"/>
           <a:stretch>
             <a:fillRect/>
           </a:stretch>
         </p:blipFill>
-        <p:spPr/>
+        <p:spPr>
+          <a:xfrm>
+            <a:off x="779463" y="2330368"/>
+            <a:ext cx="7583488" cy="3246136"/>
+          </a:xfrm>
+        </p:spPr>
       </p:pic>
     </p:spTree>
     <p:extLst>

</xml_diff>